<commit_message>
Added F-score and Ran and got the data for the RST Parses, Presentation is done
</commit_message>
<xml_diff>
--- a/Project Presentation.pptx
+++ b/Project Presentation.pptx
@@ -3106,7 +3106,12 @@
             <p:ph type="title"/>
           </p:nvPr>
         </p:nvSpPr>
-        <p:spPr/>
+        <p:spPr>
+          <a:xfrm>
+            <a:off x="457200" y="149951"/>
+            <a:ext cx="8229600" cy="1143000"/>
+          </a:xfrm>
+        </p:spPr>
         <p:txBody>
           <a:bodyPr>
             <a:normAutofit fontScale="90000"/>
@@ -3142,11 +3147,7 @@
             </a:r>
             <a:r>
               <a:rPr lang="en-US" sz="2000" dirty="0" smtClean="0"/>
-              <a:t>, </a:t>
-            </a:r>
-            <a:r>
-              <a:rPr lang="en-US" sz="2000" dirty="0" smtClean="0"/>
-              <a:t>Rohit Pathak</a:t>
+              <a:t>, Rohit Pathak</a:t>
             </a:r>
             <a:endParaRPr lang="en-US" sz="2000" dirty="0"/>
           </a:p>
@@ -3160,8 +3161,8 @@
         </p:nvSpPr>
         <p:spPr>
           <a:xfrm>
-            <a:off x="457200" y="1859353"/>
-            <a:ext cx="8229600" cy="4801315"/>
+            <a:off x="457200" y="1268527"/>
+            <a:ext cx="8229600" cy="6186310"/>
           </a:xfrm>
           <a:prstGeom prst="rect">
             <a:avLst/>
@@ -3254,7 +3255,11 @@
             </a:pPr>
             <a:r>
               <a:rPr lang="en-US" dirty="0" smtClean="0"/>
-              <a:t>Features:</a:t>
+              <a:t>Features</a:t>
+            </a:r>
+            <a:r>
+              <a:rPr lang="en-US" dirty="0" smtClean="0"/>
+              <a:t>:</a:t>
             </a:r>
           </a:p>
           <a:p>
@@ -3389,8 +3394,65 @@
                 <a:latin typeface="Courier"/>
                 <a:cs typeface="Courier"/>
               </a:rPr>
-              <a:t>{ ([POS/NEG]): count }</a:t>
-            </a:r>
+              <a:t>{ ([POS/NEG]): count </a:t>
+            </a:r>
+            <a:r>
+              <a:rPr lang="en-US" dirty="0" smtClean="0">
+                <a:latin typeface="Courier"/>
+                <a:cs typeface="Courier"/>
+              </a:rPr>
+              <a:t>}</a:t>
+            </a:r>
+          </a:p>
+          <a:p>
+            <a:pPr marL="285750" indent="-285750">
+              <a:buFont typeface="Arial"/>
+              <a:buChar char="•"/>
+            </a:pPr>
+            <a:r>
+              <a:rPr lang="en-US" dirty="0"/>
+              <a:t>Evaluation Metrics: </a:t>
+            </a:r>
+          </a:p>
+          <a:p>
+            <a:pPr marL="742950" lvl="1" indent="-285750">
+              <a:buFont typeface="Arial"/>
+              <a:buChar char="•"/>
+            </a:pPr>
+            <a:r>
+              <a:rPr lang="en-US" dirty="0" smtClean="0"/>
+              <a:t>Accuracy</a:t>
+            </a:r>
+          </a:p>
+          <a:p>
+            <a:pPr marL="742950" lvl="1" indent="-285750">
+              <a:buFont typeface="Arial"/>
+              <a:buChar char="•"/>
+            </a:pPr>
+            <a:r>
+              <a:rPr lang="en-US" dirty="0" smtClean="0"/>
+              <a:t>F </a:t>
+            </a:r>
+            <a:r>
+              <a:rPr lang="en-US" dirty="0"/>
+              <a:t>– measure</a:t>
+            </a:r>
+          </a:p>
+          <a:p>
+            <a:pPr marL="742950" lvl="1" indent="-285750">
+              <a:buFont typeface="Arial"/>
+              <a:buChar char="•"/>
+            </a:pPr>
+            <a:r>
+              <a:rPr lang="en-US" dirty="0" smtClean="0"/>
+              <a:t>ROC curve &amp; Cross Validation</a:t>
+            </a:r>
+          </a:p>
+          <a:p>
+            <a:pPr marL="742950" lvl="1" indent="-285750">
+              <a:buFont typeface="Arial"/>
+              <a:buChar char="•"/>
+            </a:pPr>
             <a:endParaRPr lang="en-US" dirty="0" smtClean="0">
               <a:latin typeface="Calibri"/>
               <a:cs typeface="Calibri"/>
@@ -3452,9 +3514,15 @@
             <p:ph type="title"/>
           </p:nvPr>
         </p:nvSpPr>
-        <p:spPr/>
-        <p:txBody>
-          <a:bodyPr/>
+        <p:spPr>
+          <a:prstGeom prst="rightArrow">
+            <a:avLst/>
+          </a:prstGeom>
+        </p:spPr>
+        <p:txBody>
+          <a:bodyPr>
+            <a:normAutofit fontScale="90000"/>
+          </a:bodyPr>
           <a:lstStyle/>
           <a:p>
             <a:r>
@@ -3474,14 +3542,14 @@
           <p:nvPr>
             <p:extLst>
               <p:ext uri="{D42A27DB-BD31-4B8C-83A1-F6EECF244321}">
-                <p14:modId xmlns:p14="http://schemas.microsoft.com/office/powerpoint/2010/main" val="1112113460"/>
+                <p14:modId xmlns:p14="http://schemas.microsoft.com/office/powerpoint/2010/main" val="2578913976"/>
               </p:ext>
             </p:extLst>
           </p:nvPr>
         </p:nvGraphicFramePr>
         <p:xfrm>
           <a:off x="1524000" y="1776726"/>
-          <a:ext cx="6096000" cy="3708400"/>
+          <a:ext cx="6323263" cy="3708400"/>
         </p:xfrm>
         <a:graphic>
           <a:graphicData uri="http://schemas.openxmlformats.org/drawingml/2006/table">
@@ -3490,9 +3558,11 @@
                 <a:tableStyleId>{5C22544A-7EE6-4342-B048-85BDC9FD1C3A}</a:tableStyleId>
               </a:tblPr>
               <a:tblGrid>
-                <a:gridCol w="2032000"/>
-                <a:gridCol w="2032000"/>
-                <a:gridCol w="2032000"/>
+                <a:gridCol w="1737895"/>
+                <a:gridCol w="1096210"/>
+                <a:gridCol w="1203158"/>
+                <a:gridCol w="1042737"/>
+                <a:gridCol w="1243263"/>
               </a:tblGrid>
               <a:tr h="370840">
                 <a:tc>
@@ -3509,15 +3579,65 @@
                   </a:txBody>
                   <a:tcPr/>
                 </a:tc>
-                <a:tc>
+                <a:tc gridSpan="2">
                   <a:txBody>
                     <a:bodyPr/>
                     <a:lstStyle/>
                     <a:p>
                       <a:r>
                         <a:rPr lang="en-US" dirty="0" smtClean="0"/>
-                        <a:t>Naïve Bayes</a:t>
+                        <a:t>Naïve </a:t>
                       </a:r>
+                      <a:r>
+                        <a:rPr lang="en-US" dirty="0" smtClean="0"/>
+                        <a:t>Bayes</a:t>
+                      </a:r>
+                      <a:endParaRPr lang="en-US" dirty="0"/>
+                    </a:p>
+                  </a:txBody>
+                  <a:tcPr/>
+                </a:tc>
+                <a:tc hMerge="1">
+                  <a:txBody>
+                    <a:bodyPr/>
+                    <a:lstStyle/>
+                    <a:p>
+                      <a:endParaRPr lang="en-US"/>
+                    </a:p>
+                  </a:txBody>
+                  <a:tcPr/>
+                </a:tc>
+                <a:tc gridSpan="2">
+                  <a:txBody>
+                    <a:bodyPr/>
+                    <a:lstStyle/>
+                    <a:p>
+                      <a:r>
+                        <a:rPr lang="en-US" dirty="0" smtClean="0"/>
+                        <a:t>Perceptron</a:t>
+                      </a:r>
+                      <a:endParaRPr lang="en-US" dirty="0"/>
+                    </a:p>
+                  </a:txBody>
+                  <a:tcPr/>
+                </a:tc>
+                <a:tc hMerge="1">
+                  <a:txBody>
+                    <a:bodyPr/>
+                    <a:lstStyle/>
+                    <a:p>
+                      <a:endParaRPr lang="en-US"/>
+                    </a:p>
+                  </a:txBody>
+                  <a:tcPr/>
+                </a:tc>
+              </a:tr>
+              <a:tr h="370840">
+                <a:tc>
+                  <a:txBody>
+                    <a:bodyPr/>
+                    <a:lstStyle/>
+                    <a:p>
                       <a:endParaRPr lang="en-US" dirty="0"/>
                     </a:p>
                   </a:txBody>
@@ -3530,12 +3650,94 @@
                     <a:p>
                       <a:r>
                         <a:rPr lang="en-US" dirty="0" smtClean="0"/>
-                        <a:t>Perceptron</a:t>
+                        <a:t>Accuracy</a:t>
                       </a:r>
                       <a:endParaRPr lang="en-US" dirty="0"/>
                     </a:p>
                   </a:txBody>
-                  <a:tcPr/>
+                  <a:tcPr>
+                    <a:lnR w="12700" cap="flat" cmpd="sng" algn="ctr">
+                      <a:solidFill>
+                        <a:scrgbClr r="0" g="0" b="0"/>
+                      </a:solidFill>
+                      <a:prstDash val="solid"/>
+                      <a:round/>
+                      <a:headEnd type="none" w="med" len="med"/>
+                      <a:tailEnd type="none" w="med" len="med"/>
+                    </a:lnR>
+                  </a:tcPr>
+                </a:tc>
+                <a:tc>
+                  <a:txBody>
+                    <a:bodyPr/>
+                    <a:lstStyle/>
+                    <a:p>
+                      <a:r>
+                        <a:rPr lang="en-US" dirty="0" smtClean="0"/>
+                        <a:t>F-measure</a:t>
+                      </a:r>
+                      <a:endParaRPr lang="en-US" dirty="0"/>
+                    </a:p>
+                  </a:txBody>
+                  <a:tcPr>
+                    <a:lnL w="12700" cap="flat" cmpd="sng" algn="ctr">
+                      <a:solidFill>
+                        <a:scrgbClr r="0" g="0" b="0"/>
+                      </a:solidFill>
+                      <a:prstDash val="solid"/>
+                      <a:round/>
+                      <a:headEnd type="none" w="med" len="med"/>
+                      <a:tailEnd type="none" w="med" len="med"/>
+                    </a:lnL>
+                  </a:tcPr>
+                </a:tc>
+                <a:tc>
+                  <a:txBody>
+                    <a:bodyPr/>
+                    <a:lstStyle/>
+                    <a:p>
+                      <a:r>
+                        <a:rPr lang="en-US" dirty="0" smtClean="0"/>
+                        <a:t>Accuracy</a:t>
+                      </a:r>
+                      <a:endParaRPr lang="en-US" dirty="0"/>
+                    </a:p>
+                  </a:txBody>
+                  <a:tcPr>
+                    <a:lnR w="12700" cap="flat" cmpd="sng" algn="ctr">
+                      <a:solidFill>
+                        <a:scrgbClr r="0" g="0" b="0"/>
+                      </a:solidFill>
+                      <a:prstDash val="solid"/>
+                      <a:round/>
+                      <a:headEnd type="none" w="med" len="med"/>
+                      <a:tailEnd type="none" w="med" len="med"/>
+                    </a:lnR>
+                  </a:tcPr>
+                </a:tc>
+                <a:tc>
+                  <a:txBody>
+                    <a:bodyPr/>
+                    <a:lstStyle/>
+                    <a:p>
+                      <a:r>
+                        <a:rPr lang="en-US" dirty="0" smtClean="0"/>
+                        <a:t>F-measure</a:t>
+                      </a:r>
+                      <a:endParaRPr lang="en-US" dirty="0"/>
+                    </a:p>
+                  </a:txBody>
+                  <a:tcPr>
+                    <a:lnL w="12700" cap="flat" cmpd="sng" algn="ctr">
+                      <a:solidFill>
+                        <a:scrgbClr r="0" g="0" b="0"/>
+                      </a:solidFill>
+                      <a:prstDash val="solid"/>
+                      <a:round/>
+                      <a:headEnd type="none" w="med" len="med"/>
+                      <a:tailEnd type="none" w="med" len="med"/>
+                    </a:lnL>
+                  </a:tcPr>
                 </a:tc>
               </a:tr>
               <a:tr h="370840">
@@ -3562,20 +3764,96 @@
                     <a:bodyPr/>
                     <a:lstStyle/>
                     <a:p>
+                      <a:r>
+                        <a:rPr lang="en-US" dirty="0" smtClean="0"/>
+                        <a:t>0.50</a:t>
+                      </a:r>
                       <a:endParaRPr lang="en-US" dirty="0"/>
                     </a:p>
                   </a:txBody>
-                  <a:tcPr/>
+                  <a:tcPr>
+                    <a:lnR w="12700" cap="flat" cmpd="sng" algn="ctr">
+                      <a:solidFill>
+                        <a:scrgbClr r="0" g="0" b="0"/>
+                      </a:solidFill>
+                      <a:prstDash val="solid"/>
+                      <a:round/>
+                      <a:headEnd type="none" w="med" len="med"/>
+                      <a:tailEnd type="none" w="med" len="med"/>
+                    </a:lnR>
+                  </a:tcPr>
                 </a:tc>
                 <a:tc>
                   <a:txBody>
                     <a:bodyPr/>
                     <a:lstStyle/>
                     <a:p>
+                      <a:r>
+                        <a:rPr lang="en-US" dirty="0" smtClean="0"/>
+                        <a:t>0.000</a:t>
+                      </a:r>
                       <a:endParaRPr lang="en-US" dirty="0"/>
                     </a:p>
                   </a:txBody>
-                  <a:tcPr/>
+                  <a:tcPr>
+                    <a:lnL w="12700" cap="flat" cmpd="sng" algn="ctr">
+                      <a:solidFill>
+                        <a:scrgbClr r="0" g="0" b="0"/>
+                      </a:solidFill>
+                      <a:prstDash val="solid"/>
+                      <a:round/>
+                      <a:headEnd type="none" w="med" len="med"/>
+                      <a:tailEnd type="none" w="med" len="med"/>
+                    </a:lnL>
+                  </a:tcPr>
+                </a:tc>
+                <a:tc>
+                  <a:txBody>
+                    <a:bodyPr/>
+                    <a:lstStyle/>
+                    <a:p>
+                      <a:r>
+                        <a:rPr lang="en-US" dirty="0" smtClean="0"/>
+                        <a:t>0.50</a:t>
+                      </a:r>
+                      <a:endParaRPr lang="en-US" dirty="0"/>
+                    </a:p>
+                  </a:txBody>
+                  <a:tcPr>
+                    <a:lnR w="12700" cap="flat" cmpd="sng" algn="ctr">
+                      <a:solidFill>
+                        <a:scrgbClr r="0" g="0" b="0"/>
+                      </a:solidFill>
+                      <a:prstDash val="solid"/>
+                      <a:round/>
+                      <a:headEnd type="none" w="med" len="med"/>
+                      <a:tailEnd type="none" w="med" len="med"/>
+                    </a:lnR>
+                  </a:tcPr>
+                </a:tc>
+                <a:tc>
+                  <a:txBody>
+                    <a:bodyPr/>
+                    <a:lstStyle/>
+                    <a:p>
+                      <a:r>
+                        <a:rPr lang="en-US" dirty="0" smtClean="0"/>
+                        <a:t>0.000</a:t>
+                      </a:r>
+                      <a:endParaRPr lang="en-US" dirty="0"/>
+                    </a:p>
+                  </a:txBody>
+                  <a:tcPr>
+                    <a:lnL w="12700" cap="flat" cmpd="sng" algn="ctr">
+                      <a:solidFill>
+                        <a:scrgbClr r="0" g="0" b="0"/>
+                      </a:solidFill>
+                      <a:prstDash val="solid"/>
+                      <a:round/>
+                      <a:headEnd type="none" w="med" len="med"/>
+                      <a:tailEnd type="none" w="med" len="med"/>
+                    </a:lnL>
+                  </a:tcPr>
                 </a:tc>
               </a:tr>
               <a:tr h="370840">
@@ -3598,20 +3876,96 @@
                     <a:bodyPr/>
                     <a:lstStyle/>
                     <a:p>
+                      <a:r>
+                        <a:rPr lang="en-US" dirty="0" smtClean="0"/>
+                        <a:t>0.50</a:t>
+                      </a:r>
                       <a:endParaRPr lang="en-US" dirty="0"/>
                     </a:p>
                   </a:txBody>
-                  <a:tcPr/>
+                  <a:tcPr>
+                    <a:lnR w="12700" cap="flat" cmpd="sng" algn="ctr">
+                      <a:solidFill>
+                        <a:scrgbClr r="0" g="0" b="0"/>
+                      </a:solidFill>
+                      <a:prstDash val="solid"/>
+                      <a:round/>
+                      <a:headEnd type="none" w="med" len="med"/>
+                      <a:tailEnd type="none" w="med" len="med"/>
+                    </a:lnR>
+                  </a:tcPr>
                 </a:tc>
                 <a:tc>
                   <a:txBody>
                     <a:bodyPr/>
                     <a:lstStyle/>
                     <a:p>
+                      <a:r>
+                        <a:rPr lang="en-US" dirty="0" smtClean="0"/>
+                        <a:t>0.231</a:t>
+                      </a:r>
                       <a:endParaRPr lang="en-US" dirty="0"/>
                     </a:p>
                   </a:txBody>
-                  <a:tcPr/>
+                  <a:tcPr>
+                    <a:lnL w="12700" cap="flat" cmpd="sng" algn="ctr">
+                      <a:solidFill>
+                        <a:scrgbClr r="0" g="0" b="0"/>
+                      </a:solidFill>
+                      <a:prstDash val="solid"/>
+                      <a:round/>
+                      <a:headEnd type="none" w="med" len="med"/>
+                      <a:tailEnd type="none" w="med" len="med"/>
+                    </a:lnL>
+                  </a:tcPr>
+                </a:tc>
+                <a:tc>
+                  <a:txBody>
+                    <a:bodyPr/>
+                    <a:lstStyle/>
+                    <a:p>
+                      <a:r>
+                        <a:rPr lang="en-US" dirty="0" smtClean="0"/>
+                        <a:t>0.48</a:t>
+                      </a:r>
+                      <a:endParaRPr lang="en-US" dirty="0"/>
+                    </a:p>
+                  </a:txBody>
+                  <a:tcPr>
+                    <a:lnR w="12700" cap="flat" cmpd="sng" algn="ctr">
+                      <a:solidFill>
+                        <a:scrgbClr r="0" g="0" b="0"/>
+                      </a:solidFill>
+                      <a:prstDash val="solid"/>
+                      <a:round/>
+                      <a:headEnd type="none" w="med" len="med"/>
+                      <a:tailEnd type="none" w="med" len="med"/>
+                    </a:lnR>
+                  </a:tcPr>
+                </a:tc>
+                <a:tc>
+                  <a:txBody>
+                    <a:bodyPr/>
+                    <a:lstStyle/>
+                    <a:p>
+                      <a:r>
+                        <a:rPr lang="en-US" dirty="0" smtClean="0"/>
+                        <a:t>0.091</a:t>
+                      </a:r>
+                      <a:endParaRPr lang="en-US" dirty="0"/>
+                    </a:p>
+                  </a:txBody>
+                  <a:tcPr>
+                    <a:lnL w="12700" cap="flat" cmpd="sng" algn="ctr">
+                      <a:solidFill>
+                        <a:scrgbClr r="0" g="0" b="0"/>
+                      </a:solidFill>
+                      <a:prstDash val="solid"/>
+                      <a:round/>
+                      <a:headEnd type="none" w="med" len="med"/>
+                      <a:tailEnd type="none" w="med" len="med"/>
+                    </a:lnL>
+                  </a:tcPr>
                 </a:tc>
               </a:tr>
               <a:tr h="370840">
@@ -3638,7 +3992,109 @@
                     <a:bodyPr/>
                     <a:lstStyle/>
                     <a:p>
-                      <a:endParaRPr lang="en-US"/>
+                      <a:r>
+                        <a:rPr lang="en-US" dirty="0" smtClean="0"/>
+                        <a:t>0.55</a:t>
+                      </a:r>
+                      <a:endParaRPr lang="en-US" dirty="0"/>
+                    </a:p>
+                  </a:txBody>
+                  <a:tcPr>
+                    <a:lnR w="12700" cap="flat" cmpd="sng" algn="ctr">
+                      <a:solidFill>
+                        <a:scrgbClr r="0" g="0" b="0"/>
+                      </a:solidFill>
+                      <a:prstDash val="solid"/>
+                      <a:round/>
+                      <a:headEnd type="none" w="med" len="med"/>
+                      <a:tailEnd type="none" w="med" len="med"/>
+                    </a:lnR>
+                  </a:tcPr>
+                </a:tc>
+                <a:tc>
+                  <a:txBody>
+                    <a:bodyPr/>
+                    <a:lstStyle/>
+                    <a:p>
+                      <a:r>
+                        <a:rPr lang="en-US" dirty="0" smtClean="0"/>
+                        <a:t>0.625</a:t>
+                      </a:r>
+                      <a:endParaRPr lang="en-US" dirty="0"/>
+                    </a:p>
+                  </a:txBody>
+                  <a:tcPr>
+                    <a:lnL w="12700" cap="flat" cmpd="sng" algn="ctr">
+                      <a:solidFill>
+                        <a:scrgbClr r="0" g="0" b="0"/>
+                      </a:solidFill>
+                      <a:prstDash val="solid"/>
+                      <a:round/>
+                      <a:headEnd type="none" w="med" len="med"/>
+                      <a:tailEnd type="none" w="med" len="med"/>
+                    </a:lnL>
+                  </a:tcPr>
+                </a:tc>
+                <a:tc>
+                  <a:txBody>
+                    <a:bodyPr/>
+                    <a:lstStyle/>
+                    <a:p>
+                      <a:r>
+                        <a:rPr lang="en-US" dirty="0" smtClean="0"/>
+                        <a:t>0.50</a:t>
+                      </a:r>
+                      <a:endParaRPr lang="en-US" dirty="0"/>
+                    </a:p>
+                  </a:txBody>
+                  <a:tcPr>
+                    <a:lnR w="12700" cap="flat" cmpd="sng" algn="ctr">
+                      <a:solidFill>
+                        <a:scrgbClr r="0" g="0" b="0"/>
+                      </a:solidFill>
+                      <a:prstDash val="solid"/>
+                      <a:round/>
+                      <a:headEnd type="none" w="med" len="med"/>
+                      <a:tailEnd type="none" w="med" len="med"/>
+                    </a:lnR>
+                  </a:tcPr>
+                </a:tc>
+                <a:tc>
+                  <a:txBody>
+                    <a:bodyPr/>
+                    <a:lstStyle/>
+                    <a:p>
+                      <a:r>
+                        <a:rPr lang="en-US" dirty="0" smtClean="0"/>
+                        <a:t>0.000</a:t>
+                      </a:r>
+                      <a:endParaRPr lang="en-US" dirty="0"/>
+                    </a:p>
+                  </a:txBody>
+                  <a:tcPr>
+                    <a:lnL w="12700" cap="flat" cmpd="sng" algn="ctr">
+                      <a:solidFill>
+                        <a:scrgbClr r="0" g="0" b="0"/>
+                      </a:solidFill>
+                      <a:prstDash val="solid"/>
+                      <a:round/>
+                      <a:headEnd type="none" w="med" len="med"/>
+                      <a:tailEnd type="none" w="med" len="med"/>
+                    </a:lnL>
+                  </a:tcPr>
+                </a:tc>
+              </a:tr>
+              <a:tr h="370840">
+                <a:tc>
+                  <a:txBody>
+                    <a:bodyPr/>
+                    <a:lstStyle/>
+                    <a:p>
+                      <a:r>
+                        <a:rPr lang="en-US" b="0" dirty="0" smtClean="0"/>
+                        <a:t>Relation BOW</a:t>
+                      </a:r>
+                      <a:endParaRPr lang="en-US" b="0" dirty="0"/>
                     </a:p>
                   </a:txBody>
                   <a:tcPr/>
@@ -3648,10 +4104,96 @@
                     <a:bodyPr/>
                     <a:lstStyle/>
                     <a:p>
+                      <a:r>
+                        <a:rPr lang="en-US" dirty="0" smtClean="0"/>
+                        <a:t>0.60</a:t>
+                      </a:r>
                       <a:endParaRPr lang="en-US" dirty="0"/>
                     </a:p>
                   </a:txBody>
-                  <a:tcPr/>
+                  <a:tcPr>
+                    <a:lnR w="12700" cap="flat" cmpd="sng" algn="ctr">
+                      <a:solidFill>
+                        <a:scrgbClr r="0" g="0" b="0"/>
+                      </a:solidFill>
+                      <a:prstDash val="solid"/>
+                      <a:round/>
+                      <a:headEnd type="none" w="med" len="med"/>
+                      <a:tailEnd type="none" w="med" len="med"/>
+                    </a:lnR>
+                  </a:tcPr>
+                </a:tc>
+                <a:tc>
+                  <a:txBody>
+                    <a:bodyPr/>
+                    <a:lstStyle/>
+                    <a:p>
+                      <a:r>
+                        <a:rPr lang="en-US" dirty="0" smtClean="0"/>
+                        <a:t>0.556</a:t>
+                      </a:r>
+                      <a:endParaRPr lang="en-US" dirty="0"/>
+                    </a:p>
+                  </a:txBody>
+                  <a:tcPr>
+                    <a:lnL w="12700" cap="flat" cmpd="sng" algn="ctr">
+                      <a:solidFill>
+                        <a:scrgbClr r="0" g="0" b="0"/>
+                      </a:solidFill>
+                      <a:prstDash val="solid"/>
+                      <a:round/>
+                      <a:headEnd type="none" w="med" len="med"/>
+                      <a:tailEnd type="none" w="med" len="med"/>
+                    </a:lnL>
+                  </a:tcPr>
+                </a:tc>
+                <a:tc>
+                  <a:txBody>
+                    <a:bodyPr/>
+                    <a:lstStyle/>
+                    <a:p>
+                      <a:r>
+                        <a:rPr lang="en-US" dirty="0" smtClean="0"/>
+                        <a:t>0.53</a:t>
+                      </a:r>
+                      <a:endParaRPr lang="en-US" dirty="0"/>
+                    </a:p>
+                  </a:txBody>
+                  <a:tcPr>
+                    <a:lnR w="12700" cap="flat" cmpd="sng" algn="ctr">
+                      <a:solidFill>
+                        <a:scrgbClr r="0" g="0" b="0"/>
+                      </a:solidFill>
+                      <a:prstDash val="solid"/>
+                      <a:round/>
+                      <a:headEnd type="none" w="med" len="med"/>
+                      <a:tailEnd type="none" w="med" len="med"/>
+                    </a:lnR>
+                  </a:tcPr>
+                </a:tc>
+                <a:tc>
+                  <a:txBody>
+                    <a:bodyPr/>
+                    <a:lstStyle/>
+                    <a:p>
+                      <a:r>
+                        <a:rPr lang="en-US" dirty="0" smtClean="0"/>
+                        <a:t>0.174</a:t>
+                      </a:r>
+                      <a:endParaRPr lang="en-US" dirty="0"/>
+                    </a:p>
+                  </a:txBody>
+                  <a:tcPr>
+                    <a:lnL w="12700" cap="flat" cmpd="sng" algn="ctr">
+                      <a:solidFill>
+                        <a:scrgbClr r="0" g="0" b="0"/>
+                      </a:solidFill>
+                      <a:prstDash val="solid"/>
+                      <a:round/>
+                      <a:headEnd type="none" w="med" len="med"/>
+                      <a:tailEnd type="none" w="med" len="med"/>
+                    </a:lnL>
+                  </a:tcPr>
                 </a:tc>
               </a:tr>
               <a:tr h="370840">
@@ -3662,7 +4204,11 @@
                     <a:p>
                       <a:r>
                         <a:rPr lang="en-US" b="1" dirty="0" smtClean="0"/>
-                        <a:t>Relation BOW</a:t>
+                        <a:t>Relation</a:t>
+                      </a:r>
+                      <a:r>
+                        <a:rPr lang="en-US" b="1" baseline="0" dirty="0" smtClean="0"/>
+                        <a:t> POS</a:t>
                       </a:r>
                       <a:endParaRPr lang="en-US" b="1" dirty="0"/>
                     </a:p>
@@ -3674,23 +4220,49 @@
                     <a:bodyPr/>
                     <a:lstStyle/>
                     <a:p>
-                      <a:endParaRPr lang="en-US"/>
+                      <a:r>
+                        <a:rPr lang="en-US" b="1" dirty="0" smtClean="0"/>
+                        <a:t>0.65</a:t>
+                      </a:r>
+                      <a:endParaRPr lang="en-US" b="1" dirty="0"/>
                     </a:p>
                   </a:txBody>
-                  <a:tcPr/>
+                  <a:tcPr>
+                    <a:lnR w="12700" cap="flat" cmpd="sng" algn="ctr">
+                      <a:solidFill>
+                        <a:scrgbClr r="0" g="0" b="0"/>
+                      </a:solidFill>
+                      <a:prstDash val="solid"/>
+                      <a:round/>
+                      <a:headEnd type="none" w="med" len="med"/>
+                      <a:tailEnd type="none" w="med" len="med"/>
+                    </a:lnR>
+                  </a:tcPr>
                 </a:tc>
                 <a:tc>
                   <a:txBody>
                     <a:bodyPr/>
                     <a:lstStyle/>
                     <a:p>
-                      <a:endParaRPr lang="en-US" dirty="0"/>
+                      <a:r>
+                        <a:rPr lang="en-US" b="1" dirty="0" smtClean="0"/>
+                        <a:t>0.696</a:t>
+                      </a:r>
+                      <a:endParaRPr lang="en-US" b="1" dirty="0"/>
                     </a:p>
                   </a:txBody>
-                  <a:tcPr/>
+                  <a:tcPr>
+                    <a:lnL w="12700" cap="flat" cmpd="sng" algn="ctr">
+                      <a:solidFill>
+                        <a:scrgbClr r="0" g="0" b="0"/>
+                      </a:solidFill>
+                      <a:prstDash val="solid"/>
+                      <a:round/>
+                      <a:headEnd type="none" w="med" len="med"/>
+                      <a:tailEnd type="none" w="med" len="med"/>
+                    </a:lnL>
+                  </a:tcPr>
                 </a:tc>
-              </a:tr>
-              <a:tr h="370840">
                 <a:tc>
                   <a:txBody>
                     <a:bodyPr/>
@@ -3698,36 +4270,62 @@
                     <a:p>
                       <a:r>
                         <a:rPr lang="en-US" dirty="0" smtClean="0"/>
-                        <a:t>Relation</a:t>
-                      </a:r>
-                      <a:r>
-                        <a:rPr lang="en-US" baseline="0" dirty="0" smtClean="0"/>
-                        <a:t> POS</a:t>
+                        <a:t>0.50</a:t>
                       </a:r>
                       <a:endParaRPr lang="en-US" dirty="0"/>
                     </a:p>
                   </a:txBody>
-                  <a:tcPr/>
+                  <a:tcPr>
+                    <a:lnR w="12700" cap="flat" cmpd="sng" algn="ctr">
+                      <a:solidFill>
+                        <a:scrgbClr r="0" g="0" b="0"/>
+                      </a:solidFill>
+                      <a:prstDash val="solid"/>
+                      <a:round/>
+                      <a:headEnd type="none" w="med" len="med"/>
+                      <a:tailEnd type="none" w="med" len="med"/>
+                    </a:lnR>
+                  </a:tcPr>
                 </a:tc>
                 <a:tc>
                   <a:txBody>
                     <a:bodyPr/>
                     <a:lstStyle/>
                     <a:p>
-                      <a:endParaRPr lang="en-US"/>
+                      <a:pPr marL="0" marR="0" indent="0" algn="l" defTabSz="457200" rtl="0" eaLnBrk="1" fontAlgn="auto" latinLnBrk="0" hangingPunct="1">
+                        <a:lnSpc>
+                          <a:spcPct val="100000"/>
+                        </a:lnSpc>
+                        <a:spcBef>
+                          <a:spcPts val="0"/>
+                        </a:spcBef>
+                        <a:spcAft>
+                          <a:spcPts val="0"/>
+                        </a:spcAft>
+                        <a:buClrTx/>
+                        <a:buSzTx/>
+                        <a:buFontTx/>
+                        <a:buNone/>
+                        <a:tabLst/>
+                        <a:defRPr/>
+                      </a:pPr>
+                      <a:r>
+                        <a:rPr lang="en-US" dirty="0" smtClean="0"/>
+                        <a:t>0.000</a:t>
+                      </a:r>
                     </a:p>
                   </a:txBody>
-                  <a:tcPr/>
-                </a:tc>
-                <a:tc>
-                  <a:txBody>
-                    <a:bodyPr/>
-                    <a:lstStyle/>
-                    <a:p>
-                      <a:endParaRPr lang="en-US" dirty="0"/>
-                    </a:p>
-                  </a:txBody>
-                  <a:tcPr/>
+                  <a:tcPr>
+                    <a:lnL w="12700" cap="flat" cmpd="sng" algn="ctr">
+                      <a:solidFill>
+                        <a:scrgbClr r="0" g="0" b="0"/>
+                      </a:solidFill>
+                      <a:prstDash val="solid"/>
+                      <a:round/>
+                      <a:headEnd type="none" w="med" len="med"/>
+                      <a:tailEnd type="none" w="med" len="med"/>
+                    </a:lnL>
+                  </a:tcPr>
                 </a:tc>
               </a:tr>
               <a:tr h="370840">
@@ -3754,20 +4352,147 @@
                     <a:bodyPr/>
                     <a:lstStyle/>
                     <a:p>
-                      <a:endParaRPr lang="en-US"/>
+                      <a:pPr marL="0" marR="0" indent="0" algn="l" defTabSz="457200" rtl="0" eaLnBrk="1" fontAlgn="auto" latinLnBrk="0" hangingPunct="1">
+                        <a:lnSpc>
+                          <a:spcPct val="100000"/>
+                        </a:lnSpc>
+                        <a:spcBef>
+                          <a:spcPts val="0"/>
+                        </a:spcBef>
+                        <a:spcAft>
+                          <a:spcPts val="0"/>
+                        </a:spcAft>
+                        <a:buClrTx/>
+                        <a:buSzTx/>
+                        <a:buFontTx/>
+                        <a:buNone/>
+                        <a:tabLst/>
+                        <a:defRPr/>
+                      </a:pPr>
+                      <a:r>
+                        <a:rPr lang="en-US" dirty="0" smtClean="0"/>
+                        <a:t>0.53</a:t>
+                      </a:r>
+                      <a:endParaRPr lang="en-US" dirty="0" smtClean="0"/>
                     </a:p>
                   </a:txBody>
-                  <a:tcPr/>
+                  <a:tcPr>
+                    <a:lnR w="12700" cap="flat" cmpd="sng" algn="ctr">
+                      <a:solidFill>
+                        <a:scrgbClr r="0" g="0" b="0"/>
+                      </a:solidFill>
+                      <a:prstDash val="solid"/>
+                      <a:round/>
+                      <a:headEnd type="none" w="med" len="med"/>
+                      <a:tailEnd type="none" w="med" len="med"/>
+                    </a:lnR>
+                  </a:tcPr>
                 </a:tc>
                 <a:tc>
                   <a:txBody>
                     <a:bodyPr/>
                     <a:lstStyle/>
                     <a:p>
+                      <a:pPr marL="0" marR="0" indent="0" algn="l" defTabSz="457200" rtl="0" eaLnBrk="1" fontAlgn="auto" latinLnBrk="0" hangingPunct="1">
+                        <a:lnSpc>
+                          <a:spcPct val="100000"/>
+                        </a:lnSpc>
+                        <a:spcBef>
+                          <a:spcPts val="0"/>
+                        </a:spcBef>
+                        <a:spcAft>
+                          <a:spcPts val="0"/>
+                        </a:spcAft>
+                        <a:buClrTx/>
+                        <a:buSzTx/>
+                        <a:buFontTx/>
+                        <a:buNone/>
+                        <a:tabLst/>
+                        <a:defRPr/>
+                      </a:pPr>
+                      <a:r>
+                        <a:rPr lang="en-US" dirty="0" smtClean="0"/>
+                        <a:t>0.536</a:t>
+                      </a:r>
+                      <a:endParaRPr lang="en-US" dirty="0" smtClean="0"/>
+                    </a:p>
+                  </a:txBody>
+                  <a:tcPr>
+                    <a:lnL w="12700" cap="flat" cmpd="sng" algn="ctr">
+                      <a:solidFill>
+                        <a:scrgbClr r="0" g="0" b="0"/>
+                      </a:solidFill>
+                      <a:prstDash val="solid"/>
+                      <a:round/>
+                      <a:headEnd type="none" w="med" len="med"/>
+                      <a:tailEnd type="none" w="med" len="med"/>
+                    </a:lnL>
+                  </a:tcPr>
+                </a:tc>
+                <a:tc>
+                  <a:txBody>
+                    <a:bodyPr/>
+                    <a:lstStyle/>
+                    <a:p>
+                      <a:pPr marL="0" marR="0" indent="0" algn="l" defTabSz="457200" rtl="0" eaLnBrk="1" fontAlgn="auto" latinLnBrk="0" hangingPunct="1">
+                        <a:lnSpc>
+                          <a:spcPct val="100000"/>
+                        </a:lnSpc>
+                        <a:spcBef>
+                          <a:spcPts val="0"/>
+                        </a:spcBef>
+                        <a:spcAft>
+                          <a:spcPts val="0"/>
+                        </a:spcAft>
+                        <a:buClrTx/>
+                        <a:buSzTx/>
+                        <a:buFontTx/>
+                        <a:buNone/>
+                        <a:tabLst/>
+                        <a:defRPr/>
+                      </a:pPr>
+                      <a:r>
+                        <a:rPr lang="en-US" dirty="0" smtClean="0"/>
+                        <a:t>0.50</a:t>
+                      </a:r>
+                      <a:endParaRPr lang="en-US" dirty="0" smtClean="0"/>
+                    </a:p>
+                  </a:txBody>
+                  <a:tcPr>
+                    <a:lnR w="12700" cap="flat" cmpd="sng" algn="ctr">
+                      <a:solidFill>
+                        <a:scrgbClr r="0" g="0" b="0"/>
+                      </a:solidFill>
+                      <a:prstDash val="solid"/>
+                      <a:round/>
+                      <a:headEnd type="none" w="med" len="med"/>
+                      <a:tailEnd type="none" w="med" len="med"/>
+                    </a:lnR>
+                  </a:tcPr>
+                </a:tc>
+                <a:tc>
+                  <a:txBody>
+                    <a:bodyPr/>
+                    <a:lstStyle/>
+                    <a:p>
+                      <a:r>
+                        <a:rPr lang="en-US" dirty="0" smtClean="0"/>
+                        <a:t>0.091</a:t>
+                      </a:r>
                       <a:endParaRPr lang="en-US" dirty="0"/>
                     </a:p>
                   </a:txBody>
-                  <a:tcPr/>
+                  <a:tcPr>
+                    <a:lnL w="12700" cap="flat" cmpd="sng" algn="ctr">
+                      <a:solidFill>
+                        <a:scrgbClr r="0" g="0" b="0"/>
+                      </a:solidFill>
+                      <a:prstDash val="solid"/>
+                      <a:round/>
+                      <a:headEnd type="none" w="med" len="med"/>
+                      <a:tailEnd type="none" w="med" len="med"/>
+                    </a:lnL>
+                  </a:tcPr>
                 </a:tc>
               </a:tr>
               <a:tr h="370840">
@@ -3793,7 +4518,37 @@
                       <a:endParaRPr lang="en-US"/>
                     </a:p>
                   </a:txBody>
-                  <a:tcPr/>
+                  <a:tcPr>
+                    <a:lnR w="12700" cap="flat" cmpd="sng" algn="ctr">
+                      <a:solidFill>
+                        <a:scrgbClr r="0" g="0" b="0"/>
+                      </a:solidFill>
+                      <a:prstDash val="solid"/>
+                      <a:round/>
+                      <a:headEnd type="none" w="med" len="med"/>
+                      <a:tailEnd type="none" w="med" len="med"/>
+                    </a:lnR>
+                  </a:tcPr>
+                </a:tc>
+                <a:tc>
+                  <a:txBody>
+                    <a:bodyPr/>
+                    <a:lstStyle/>
+                    <a:p>
+                      <a:endParaRPr lang="en-US"/>
+                    </a:p>
+                  </a:txBody>
+                  <a:tcPr>
+                    <a:lnL w="12700" cap="flat" cmpd="sng" algn="ctr">
+                      <a:solidFill>
+                        <a:scrgbClr r="0" g="0" b="0"/>
+                      </a:solidFill>
+                      <a:prstDash val="solid"/>
+                      <a:round/>
+                      <a:headEnd type="none" w="med" len="med"/>
+                      <a:tailEnd type="none" w="med" len="med"/>
+                    </a:lnL>
+                  </a:tcPr>
                 </a:tc>
                 <a:tc>
                   <a:txBody>
@@ -3803,29 +4558,17 @@
                       <a:endParaRPr lang="en-US" dirty="0"/>
                     </a:p>
                   </a:txBody>
-                  <a:tcPr/>
-                </a:tc>
-              </a:tr>
-              <a:tr h="370840">
-                <a:tc>
-                  <a:txBody>
-                    <a:bodyPr/>
-                    <a:lstStyle/>
-                    <a:p>
-                      <a:endParaRPr lang="en-US" dirty="0"/>
-                    </a:p>
-                  </a:txBody>
-                  <a:tcPr/>
-                </a:tc>
-                <a:tc>
-                  <a:txBody>
-                    <a:bodyPr/>
-                    <a:lstStyle/>
-                    <a:p>
-                      <a:endParaRPr lang="en-US"/>
-                    </a:p>
-                  </a:txBody>
-                  <a:tcPr/>
+                  <a:tcPr>
+                    <a:lnR w="12700" cap="flat" cmpd="sng" algn="ctr">
+                      <a:solidFill>
+                        <a:scrgbClr r="0" g="0" b="0"/>
+                      </a:solidFill>
+                      <a:prstDash val="solid"/>
+                      <a:round/>
+                      <a:headEnd type="none" w="med" len="med"/>
+                      <a:tailEnd type="none" w="med" len="med"/>
+                    </a:lnR>
+                  </a:tcPr>
                 </a:tc>
                 <a:tc>
                   <a:txBody>
@@ -3835,7 +4578,17 @@
                       <a:endParaRPr lang="en-US" dirty="0"/>
                     </a:p>
                   </a:txBody>
-                  <a:tcPr/>
+                  <a:tcPr>
+                    <a:lnL w="12700" cap="flat" cmpd="sng" algn="ctr">
+                      <a:solidFill>
+                        <a:scrgbClr r="0" g="0" b="0"/>
+                      </a:solidFill>
+                      <a:prstDash val="solid"/>
+                      <a:round/>
+                      <a:headEnd type="none" w="med" len="med"/>
+                      <a:tailEnd type="none" w="med" len="med"/>
+                    </a:lnL>
+                  </a:tcPr>
                 </a:tc>
               </a:tr>
               <a:tr h="370840">
@@ -3846,7 +4599,7 @@
                     <a:p>
                       <a:r>
                         <a:rPr lang="en-US" dirty="0" smtClean="0"/>
-                        <a:t>Combined</a:t>
+                        <a:t>RST Combined</a:t>
                       </a:r>
                       <a:endParaRPr lang="en-US" dirty="0"/>
                     </a:p>
@@ -3858,26 +4611,132 @@
                     <a:bodyPr/>
                     <a:lstStyle/>
                     <a:p>
+                      <a:r>
+                        <a:rPr lang="en-US" dirty="0" smtClean="0"/>
+                        <a:t>0.63</a:t>
+                      </a:r>
                       <a:endParaRPr lang="en-US" dirty="0"/>
                     </a:p>
                   </a:txBody>
-                  <a:tcPr/>
+                  <a:tcPr>
+                    <a:lnR w="12700" cap="flat" cmpd="sng" algn="ctr">
+                      <a:solidFill>
+                        <a:scrgbClr r="0" g="0" b="0"/>
+                      </a:solidFill>
+                      <a:prstDash val="solid"/>
+                      <a:round/>
+                      <a:headEnd type="none" w="med" len="med"/>
+                      <a:tailEnd type="none" w="med" len="med"/>
+                    </a:lnR>
+                  </a:tcPr>
                 </a:tc>
                 <a:tc>
                   <a:txBody>
                     <a:bodyPr/>
                     <a:lstStyle/>
                     <a:p>
+                      <a:r>
+                        <a:rPr lang="en-US" dirty="0" smtClean="0"/>
+                        <a:t>0.545</a:t>
+                      </a:r>
                       <a:endParaRPr lang="en-US" dirty="0"/>
                     </a:p>
                   </a:txBody>
-                  <a:tcPr/>
+                  <a:tcPr>
+                    <a:lnL w="12700" cap="flat" cmpd="sng" algn="ctr">
+                      <a:solidFill>
+                        <a:scrgbClr r="0" g="0" b="0"/>
+                      </a:solidFill>
+                      <a:prstDash val="solid"/>
+                      <a:round/>
+                      <a:headEnd type="none" w="med" len="med"/>
+                      <a:tailEnd type="none" w="med" len="med"/>
+                    </a:lnL>
+                  </a:tcPr>
+                </a:tc>
+                <a:tc>
+                  <a:txBody>
+                    <a:bodyPr/>
+                    <a:lstStyle/>
+                    <a:p>
+                      <a:r>
+                        <a:rPr lang="en-US" dirty="0" smtClean="0"/>
+                        <a:t>0.50</a:t>
+                      </a:r>
+                      <a:endParaRPr lang="en-US" dirty="0"/>
+                    </a:p>
+                  </a:txBody>
+                  <a:tcPr>
+                    <a:lnR w="12700" cap="flat" cmpd="sng" algn="ctr">
+                      <a:solidFill>
+                        <a:scrgbClr r="0" g="0" b="0"/>
+                      </a:solidFill>
+                      <a:prstDash val="solid"/>
+                      <a:round/>
+                      <a:headEnd type="none" w="med" len="med"/>
+                      <a:tailEnd type="none" w="med" len="med"/>
+                    </a:lnR>
+                  </a:tcPr>
+                </a:tc>
+                <a:tc>
+                  <a:txBody>
+                    <a:bodyPr/>
+                    <a:lstStyle/>
+                    <a:p>
+                      <a:r>
+                        <a:rPr lang="en-US" dirty="0" smtClean="0"/>
+                        <a:t>0.000</a:t>
+                      </a:r>
+                      <a:endParaRPr lang="en-US" dirty="0"/>
+                    </a:p>
+                  </a:txBody>
+                  <a:tcPr>
+                    <a:lnL w="12700" cap="flat" cmpd="sng" algn="ctr">
+                      <a:solidFill>
+                        <a:scrgbClr r="0" g="0" b="0"/>
+                      </a:solidFill>
+                      <a:prstDash val="solid"/>
+                      <a:round/>
+                      <a:headEnd type="none" w="med" len="med"/>
+                      <a:tailEnd type="none" w="med" len="med"/>
+                    </a:lnL>
+                  </a:tcPr>
                 </a:tc>
               </a:tr>
             </a:tbl>
           </a:graphicData>
         </a:graphic>
       </p:graphicFrame>
+      <p:sp>
+        <p:nvSpPr>
+          <p:cNvPr id="3" name="TextBox 2"/>
+          <p:cNvSpPr txBox="1"/>
+          <p:nvPr/>
+        </p:nvSpPr>
+        <p:spPr>
+          <a:xfrm>
+            <a:off x="5572251" y="5594584"/>
+            <a:ext cx="2849854" cy="923330"/>
+          </a:xfrm>
+          <a:prstGeom prst="rect">
+            <a:avLst/>
+          </a:prstGeom>
+          <a:noFill/>
+        </p:spPr>
+        <p:txBody>
+          <a:bodyPr wrap="square" rtlCol="0">
+            <a:spAutoFit/>
+          </a:bodyPr>
+          <a:lstStyle/>
+          <a:p>
+            <a:r>
+              <a:rPr lang="en-US" dirty="0" smtClean="0"/>
+              <a:t>Disclaimer: The Perceptron maybe producing incorrect results.  </a:t>
+            </a:r>
+            <a:endParaRPr lang="en-US" dirty="0"/>
+          </a:p>
+        </p:txBody>
+      </p:sp>
     </p:spTree>
     <p:extLst>
       <p:ext uri="{BB962C8B-B14F-4D97-AF65-F5344CB8AC3E}">

</xml_diff>